<commit_message>
adding changes made to presentation
</commit_message>
<xml_diff>
--- a/presentation/perigo_16_10.pptx
+++ b/presentation/perigo_16_10.pptx
@@ -3281,7 +3281,7 @@
       </p:grpSpPr>
       <p:pic>
         <p:nvPicPr>
-          <p:cNvPr id="4" name="Picture 3"/>
+          <p:cNvPr id="2" name="Picture 1"/>
           <p:cNvPicPr>
             <a:picLocks noChangeAspect="1"/>
           </p:cNvPicPr>
@@ -3313,13 +3313,13 @@
   <p:clrMapOvr>
     <a:masterClrMapping/>
   </p:clrMapOvr>
-  <mc:AlternateContent xmlns:mc="http://schemas.openxmlformats.org/markup-compatibility/2006">
-    <mc:Choice xmlns:p14="http://schemas.microsoft.com/office/powerpoint/2010/main" Requires="p14">
+  <mc:AlternateContent xmlns:mc="http://schemas.openxmlformats.org/markup-compatibility/2006" xmlns:p14="http://schemas.microsoft.com/office/powerpoint/2010/main">
+    <mc:Choice Requires="p14">
       <p:transition spd="med" p14:dur="700">
         <p:fade/>
       </p:transition>
     </mc:Choice>
-    <mc:Fallback>
+    <mc:Fallback xmlns="">
       <p:transition spd="med">
         <p:fade/>
       </p:transition>
@@ -3354,7 +3354,7 @@
       </p:grpSpPr>
       <p:pic>
         <p:nvPicPr>
-          <p:cNvPr id="2" name="Picture 1"/>
+          <p:cNvPr id="4" name="Picture 3"/>
           <p:cNvPicPr>
             <a:picLocks noChangeAspect="1"/>
           </p:cNvPicPr>
@@ -3415,7 +3415,7 @@
       </p:grpSpPr>
       <p:pic>
         <p:nvPicPr>
-          <p:cNvPr id="2" name="Picture 1"/>
+          <p:cNvPr id="4" name="Picture 3"/>
           <p:cNvPicPr>
             <a:picLocks noChangeAspect="1"/>
           </p:cNvPicPr>
@@ -3476,7 +3476,7 @@
       </p:grpSpPr>
       <p:pic>
         <p:nvPicPr>
-          <p:cNvPr id="2" name="Picture 1"/>
+          <p:cNvPr id="4" name="Picture 3"/>
           <p:cNvPicPr>
             <a:picLocks noChangeAspect="1"/>
           </p:cNvPicPr>
@@ -3537,7 +3537,7 @@
       </p:grpSpPr>
       <p:pic>
         <p:nvPicPr>
-          <p:cNvPr id="2" name="Picture 1"/>
+          <p:cNvPr id="4" name="Picture 3"/>
           <p:cNvPicPr>
             <a:picLocks noChangeAspect="1"/>
           </p:cNvPicPr>
@@ -3598,7 +3598,7 @@
       </p:grpSpPr>
       <p:pic>
         <p:nvPicPr>
-          <p:cNvPr id="2" name="Picture 1"/>
+          <p:cNvPr id="4" name="Picture 3"/>
           <p:cNvPicPr>
             <a:picLocks noChangeAspect="1"/>
           </p:cNvPicPr>
@@ -3659,7 +3659,7 @@
       </p:grpSpPr>
       <p:pic>
         <p:nvPicPr>
-          <p:cNvPr id="2" name="Picture 1"/>
+          <p:cNvPr id="4" name="Picture 3"/>
           <p:cNvPicPr>
             <a:picLocks noChangeAspect="1"/>
           </p:cNvPicPr>
@@ -3720,7 +3720,7 @@
       </p:grpSpPr>
       <p:pic>
         <p:nvPicPr>
-          <p:cNvPr id="2" name="Picture 1"/>
+          <p:cNvPr id="6" name="Picture 5"/>
           <p:cNvPicPr>
             <a:picLocks noChangeAspect="1"/>
           </p:cNvPicPr>
@@ -3781,7 +3781,7 @@
       </p:grpSpPr>
       <p:pic>
         <p:nvPicPr>
-          <p:cNvPr id="3" name="Picture 2"/>
+          <p:cNvPr id="2" name="Picture 1"/>
           <p:cNvPicPr>
             <a:picLocks noChangeAspect="1"/>
           </p:cNvPicPr>

</xml_diff>